<commit_message>
Updated Executive Managment Summary.pptx
</commit_message>
<xml_diff>
--- a/Gestion/17.10.11/Executive Managment Summary.pptx
+++ b/Gestion/17.10.11/Executive Managment Summary.pptx
@@ -196,7 +196,7 @@
           <a:p>
             <a:fld id="{7815B904-3C16-42C3-AA68-022B6E41D318}" type="datetimeFigureOut">
               <a:rPr lang="es-AR" smtClean="0"/>
-              <a:t>16/10/2011</a:t>
+              <a:t>17/10/2011</a:t>
             </a:fld>
             <a:endParaRPr lang="es-AR"/>
           </a:p>
@@ -1510,7 +1510,7 @@
             <a:fld id="{627ECF44-52F0-47F4-B6A8-DBC4CF92CDB6}" type="datetimeFigureOut">
               <a:rPr lang="es-AR" smtClean="0"/>
               <a:pPr/>
-              <a:t>16/10/2011</a:t>
+              <a:t>17/10/2011</a:t>
             </a:fld>
             <a:endParaRPr lang="es-AR"/>
           </a:p>
@@ -1708,7 +1708,7 @@
             <a:fld id="{627ECF44-52F0-47F4-B6A8-DBC4CF92CDB6}" type="datetimeFigureOut">
               <a:rPr lang="es-AR" smtClean="0"/>
               <a:pPr/>
-              <a:t>16/10/2011</a:t>
+              <a:t>17/10/2011</a:t>
             </a:fld>
             <a:endParaRPr lang="es-AR"/>
           </a:p>
@@ -1895,7 +1895,7 @@
             <a:fld id="{627ECF44-52F0-47F4-B6A8-DBC4CF92CDB6}" type="datetimeFigureOut">
               <a:rPr lang="es-AR" smtClean="0"/>
               <a:pPr/>
-              <a:t>16/10/2011</a:t>
+              <a:t>17/10/2011</a:t>
             </a:fld>
             <a:endParaRPr lang="es-AR"/>
           </a:p>
@@ -2047,7 +2047,7 @@
             <a:fld id="{627ECF44-52F0-47F4-B6A8-DBC4CF92CDB6}" type="datetimeFigureOut">
               <a:rPr lang="es-AR" smtClean="0"/>
               <a:pPr/>
-              <a:t>16/10/2011</a:t>
+              <a:t>17/10/2011</a:t>
             </a:fld>
             <a:endParaRPr lang="es-AR"/>
           </a:p>
@@ -2304,7 +2304,7 @@
             <a:fld id="{627ECF44-52F0-47F4-B6A8-DBC4CF92CDB6}" type="datetimeFigureOut">
               <a:rPr lang="es-AR" smtClean="0"/>
               <a:pPr/>
-              <a:t>16/10/2011</a:t>
+              <a:t>17/10/2011</a:t>
             </a:fld>
             <a:endParaRPr lang="es-AR"/>
           </a:p>
@@ -2715,7 +2715,7 @@
             <a:fld id="{627ECF44-52F0-47F4-B6A8-DBC4CF92CDB6}" type="datetimeFigureOut">
               <a:rPr lang="es-AR" smtClean="0"/>
               <a:pPr/>
-              <a:t>16/10/2011</a:t>
+              <a:t>17/10/2011</a:t>
             </a:fld>
             <a:endParaRPr lang="es-AR"/>
           </a:p>
@@ -3163,7 +3163,7 @@
             <a:fld id="{627ECF44-52F0-47F4-B6A8-DBC4CF92CDB6}" type="datetimeFigureOut">
               <a:rPr lang="es-AR" smtClean="0"/>
               <a:pPr/>
-              <a:t>16/10/2011</a:t>
+              <a:t>17/10/2011</a:t>
             </a:fld>
             <a:endParaRPr lang="es-AR"/>
           </a:p>
@@ -3266,7 +3266,7 @@
             <a:fld id="{627ECF44-52F0-47F4-B6A8-DBC4CF92CDB6}" type="datetimeFigureOut">
               <a:rPr lang="es-AR" smtClean="0"/>
               <a:pPr/>
-              <a:t>16/10/2011</a:t>
+              <a:t>17/10/2011</a:t>
             </a:fld>
             <a:endParaRPr lang="es-AR"/>
           </a:p>
@@ -3389,7 +3389,7 @@
             <a:fld id="{627ECF44-52F0-47F4-B6A8-DBC4CF92CDB6}" type="datetimeFigureOut">
               <a:rPr lang="es-AR" smtClean="0"/>
               <a:pPr/>
-              <a:t>16/10/2011</a:t>
+              <a:t>17/10/2011</a:t>
             </a:fld>
             <a:endParaRPr lang="es-AR"/>
           </a:p>
@@ -3665,7 +3665,7 @@
             <a:fld id="{627ECF44-52F0-47F4-B6A8-DBC4CF92CDB6}" type="datetimeFigureOut">
               <a:rPr lang="es-AR" smtClean="0"/>
               <a:pPr/>
-              <a:t>16/10/2011</a:t>
+              <a:t>17/10/2011</a:t>
             </a:fld>
             <a:endParaRPr lang="es-AR"/>
           </a:p>
@@ -3872,7 +3872,7 @@
             <a:fld id="{627ECF44-52F0-47F4-B6A8-DBC4CF92CDB6}" type="datetimeFigureOut">
               <a:rPr lang="es-AR" smtClean="0"/>
               <a:pPr/>
-              <a:t>16/10/2011</a:t>
+              <a:t>17/10/2011</a:t>
             </a:fld>
             <a:endParaRPr lang="es-AR"/>
           </a:p>
@@ -4983,7 +4983,7 @@
             <a:fld id="{627ECF44-52F0-47F4-B6A8-DBC4CF92CDB6}" type="datetimeFigureOut">
               <a:rPr lang="es-AR" smtClean="0"/>
               <a:pPr/>
-              <a:t>16/10/2011</a:t>
+              <a:t>17/10/2011</a:t>
             </a:fld>
             <a:endParaRPr lang="es-AR"/>
           </a:p>
@@ -5458,11 +5458,7 @@
           <a:p>
             <a:r>
               <a:rPr lang="es-AR" smtClean="0"/>
-              <a:t>17</a:t>
-            </a:r>
-            <a:r>
-              <a:rPr lang="es-AR" smtClean="0"/>
-              <a:t>/10</a:t>
+              <a:t>17/10</a:t>
             </a:r>
             <a:endParaRPr lang="es-AR" dirty="0" smtClean="0"/>
           </a:p>
@@ -5619,7 +5615,7 @@
           <a:p>
             <a:r>
               <a:rPr lang="es-AR" dirty="0" smtClean="0"/>
-              <a:t>Objetivo</a:t>
+              <a:t>Objetivo pasado</a:t>
             </a:r>
             <a:endParaRPr lang="es-AR" dirty="0"/>
           </a:p>
@@ -6034,9 +6030,20 @@
             </a:r>
             <a:r>
               <a:rPr lang="es-AR" dirty="0" smtClean="0"/>
-              <a:t> a completar el % de Done y resolver bugs de nivel Medio.</a:t>
-            </a:r>
-            <a:endParaRPr lang="es-AR" dirty="0" smtClean="0"/>
+              <a:t> a completar el % </a:t>
+            </a:r>
+            <a:r>
+              <a:rPr lang="es-AR" smtClean="0"/>
+              <a:t>de </a:t>
+            </a:r>
+            <a:r>
+              <a:rPr lang="es-AR" smtClean="0"/>
+              <a:t>Done faltante </a:t>
+            </a:r>
+            <a:r>
+              <a:rPr lang="es-AR" dirty="0" smtClean="0"/>
+              <a:t>y resolver bugs de nivel Medio.</a:t>
+            </a:r>
           </a:p>
         </p:txBody>
       </p:sp>

</xml_diff>